<commit_message>
Slide updates and todos
</commit_message>
<xml_diff>
--- a/Slides.pptx
+++ b/Slides.pptx
@@ -226,7 +226,7 @@
           <a:p>
             <a:fld id="{8AAC1278-1473-493B-ACC6-443853387D40}" type="datetimeFigureOut">
               <a:rPr lang="en-US" smtClean="0"/>
-              <a:t>10/25/2017</a:t>
+              <a:t>10/26/2017</a:t>
             </a:fld>
             <a:endParaRPr lang="en-US"/>
           </a:p>
@@ -623,128 +623,7 @@
           <a:p>
             <a:r>
               <a:rPr lang="en-US" dirty="0"/>
-              <a:t>The domain of order processing is a good domain to apply messaging because every order can be answered with “thank you we will shortly process the order”</a:t>
-            </a:r>
-          </a:p>
-          <a:p>
-            <a:endParaRPr lang="en-US" dirty="0"/>
-          </a:p>
-          <a:p>
-            <a:r>
-              <a:rPr lang="en-US" dirty="0"/>
-              <a:t>The stateless frontend tier and the </a:t>
-            </a:r>
-            <a:r>
-              <a:rPr lang="en-US" dirty="0" err="1"/>
-              <a:t>stateful</a:t>
-            </a:r>
-            <a:r>
-              <a:rPr lang="en-US" dirty="0"/>
-              <a:t> middle tier with the compute remains the same. But between the stateless and the </a:t>
-            </a:r>
-            <a:r>
-              <a:rPr lang="en-US" dirty="0" err="1"/>
-              <a:t>stateful</a:t>
-            </a:r>
-            <a:r>
-              <a:rPr lang="en-US" dirty="0"/>
-              <a:t> tier we should introduce some kind of broker middleware like Azure Service Bus, Azure Storage Queues or RabbitMQ for on-premises. The broker middleware will contain a queue for our chocolate orders. Of course not everything has to go through the queue. Only things like orders that need to be processed in order and potentially throttled. After all it is better to process orders a bit later than loosing them right? With that we get</a:t>
-            </a:r>
-          </a:p>
-          <a:p>
-            <a:endParaRPr lang="en-US" dirty="0"/>
-          </a:p>
-          <a:p>
-            <a:pPr marL="171450" indent="-171450">
-              <a:buFont typeface="Arial" panose="020B0604020202020204" pitchFamily="34" charset="0"/>
-              <a:buChar char="•"/>
-            </a:pPr>
-            <a:r>
-              <a:rPr lang="en-US" dirty="0"/>
-              <a:t>Decoupling especially temporal</a:t>
-            </a:r>
-          </a:p>
-          <a:p>
-            <a:pPr marL="171450" indent="-171450">
-              <a:buFont typeface="Arial" panose="020B0604020202020204" pitchFamily="34" charset="0"/>
-              <a:buChar char="•"/>
-            </a:pPr>
-            <a:r>
-              <a:rPr lang="en-US" dirty="0"/>
-              <a:t>Competing consumers</a:t>
-            </a:r>
-          </a:p>
-          <a:p>
-            <a:pPr marL="171450" indent="-171450">
-              <a:buFont typeface="Arial" panose="020B0604020202020204" pitchFamily="34" charset="0"/>
-              <a:buChar char="•"/>
-            </a:pPr>
-            <a:r>
-              <a:rPr lang="en-US" dirty="0"/>
-              <a:t>Awesome scaling</a:t>
-            </a:r>
-          </a:p>
-          <a:p>
-            <a:pPr marL="171450" indent="-171450">
-              <a:buFont typeface="Arial" panose="020B0604020202020204" pitchFamily="34" charset="0"/>
-              <a:buChar char="•"/>
-            </a:pPr>
-            <a:r>
-              <a:rPr lang="en-US" dirty="0"/>
-              <a:t>Throttling</a:t>
-            </a:r>
-          </a:p>
-          <a:p>
-            <a:pPr marL="171450" indent="-171450">
-              <a:buFont typeface="Arial" panose="020B0604020202020204" pitchFamily="34" charset="0"/>
-              <a:buChar char="•"/>
-            </a:pPr>
-            <a:r>
-              <a:rPr lang="en-US" dirty="0"/>
-              <a:t>Retries and business transactions to </a:t>
-            </a:r>
-            <a:r>
-              <a:rPr lang="en-US" dirty="0" err="1"/>
-              <a:t>stateful</a:t>
-            </a:r>
-            <a:r>
-              <a:rPr lang="en-US" dirty="0"/>
-              <a:t> </a:t>
-            </a:r>
-            <a:r>
-              <a:rPr lang="en-US" dirty="0" err="1"/>
-              <a:t>middletier</a:t>
-            </a:r>
-            <a:endParaRPr lang="en-US" dirty="0"/>
-          </a:p>
-          <a:p>
-            <a:pPr marL="171450" indent="-171450">
-              <a:buFont typeface="Arial" panose="020B0604020202020204" pitchFamily="34" charset="0"/>
-              <a:buChar char="•"/>
-            </a:pPr>
-            <a:r>
-              <a:rPr lang="en-US" dirty="0"/>
-              <a:t>Intent capturing request as messages</a:t>
-            </a:r>
-          </a:p>
-          <a:p>
-            <a:pPr marL="171450" indent="-171450">
-              <a:buFont typeface="Arial" panose="020B0604020202020204" pitchFamily="34" charset="0"/>
-              <a:buChar char="•"/>
-            </a:pPr>
-            <a:r>
-              <a:rPr lang="en-US" dirty="0"/>
-              <a:t>Reactive</a:t>
-            </a:r>
-          </a:p>
-          <a:p>
-            <a:pPr marL="171450" indent="-171450">
-              <a:buFont typeface="Arial" panose="020B0604020202020204" pitchFamily="34" charset="0"/>
-              <a:buChar char="•"/>
-            </a:pPr>
-            <a:r>
-              <a:rPr lang="en-US" dirty="0"/>
-              <a:t>Auditing of orders</a:t>
+              <a:t>So they started brainstorming an additional architecture approach.</a:t>
             </a:r>
             <a:endParaRPr lang="de-CH" dirty="0"/>
           </a:p>
@@ -765,18 +644,18 @@
           <a:bodyPr/>
           <a:lstStyle/>
           <a:p>
-            <a:fld id="{59E9685D-E391-4BCC-987B-6FB0218A8DB9}" type="slidenum">
-              <a:rPr lang="en-US" smtClean="0"/>
-              <a:t>11</a:t>
+            <a:fld id="{9BCA07FD-5BD5-4529-84B0-48DD2C561176}" type="slidenum">
+              <a:rPr lang="de-CH" smtClean="0"/>
+              <a:t>10</a:t>
             </a:fld>
-            <a:endParaRPr lang="en-US"/>
+            <a:endParaRPr lang="de-CH"/>
           </a:p>
         </p:txBody>
       </p:sp>
     </p:spTree>
     <p:extLst>
       <p:ext uri="{BB962C8B-B14F-4D97-AF65-F5344CB8AC3E}">
-        <p14:creationId xmlns:p14="http://schemas.microsoft.com/office/powerpoint/2010/main" val="384687694"/>
+        <p14:creationId xmlns:p14="http://schemas.microsoft.com/office/powerpoint/2010/main" val="1944380609"/>
       </p:ext>
     </p:extLst>
   </p:cSld>
@@ -830,7 +709,132 @@
           <a:bodyPr/>
           <a:lstStyle/>
           <a:p>
-            <a:endParaRPr lang="en-CH" dirty="0"/>
+            <a:r>
+              <a:rPr lang="en-US" dirty="0"/>
+              <a:t>The domain of order processing is a good domain to apply messaging because every order can be answered with “thank you we will shortly process the order”</a:t>
+            </a:r>
+          </a:p>
+          <a:p>
+            <a:endParaRPr lang="en-US" dirty="0"/>
+          </a:p>
+          <a:p>
+            <a:r>
+              <a:rPr lang="en-US" dirty="0"/>
+              <a:t>The stateless frontend tier and the </a:t>
+            </a:r>
+            <a:r>
+              <a:rPr lang="en-US" dirty="0" err="1"/>
+              <a:t>stateful</a:t>
+            </a:r>
+            <a:r>
+              <a:rPr lang="en-US" dirty="0"/>
+              <a:t> middle tier with the compute remains the same. But between the stateless and the </a:t>
+            </a:r>
+            <a:r>
+              <a:rPr lang="en-US" dirty="0" err="1"/>
+              <a:t>stateful</a:t>
+            </a:r>
+            <a:r>
+              <a:rPr lang="en-US" dirty="0"/>
+              <a:t> tier we should introduce some kind of broker middleware like Azure Service Bus, Azure Storage Queues or RabbitMQ for on-premises. The broker middleware will contain a queue for our chocolate orders. Of course not everything has to go through the queue. Only things like orders that need to be processed in order and potentially throttled. After all it is better to process orders a bit later than loosing them right? With that we get</a:t>
+            </a:r>
+          </a:p>
+          <a:p>
+            <a:endParaRPr lang="en-US" dirty="0"/>
+          </a:p>
+          <a:p>
+            <a:pPr marL="171450" indent="-171450">
+              <a:buFont typeface="Arial" panose="020B0604020202020204" pitchFamily="34" charset="0"/>
+              <a:buChar char="•"/>
+            </a:pPr>
+            <a:r>
+              <a:rPr lang="en-US" dirty="0"/>
+              <a:t>Decoupling especially temporal</a:t>
+            </a:r>
+          </a:p>
+          <a:p>
+            <a:pPr marL="171450" indent="-171450">
+              <a:buFont typeface="Arial" panose="020B0604020202020204" pitchFamily="34" charset="0"/>
+              <a:buChar char="•"/>
+            </a:pPr>
+            <a:r>
+              <a:rPr lang="en-US" dirty="0"/>
+              <a:t>Competing consumers</a:t>
+            </a:r>
+          </a:p>
+          <a:p>
+            <a:pPr marL="171450" indent="-171450">
+              <a:buFont typeface="Arial" panose="020B0604020202020204" pitchFamily="34" charset="0"/>
+              <a:buChar char="•"/>
+            </a:pPr>
+            <a:r>
+              <a:rPr lang="en-US" dirty="0"/>
+              <a:t>Awesome scaling</a:t>
+            </a:r>
+          </a:p>
+          <a:p>
+            <a:pPr marL="171450" indent="-171450">
+              <a:buFont typeface="Arial" panose="020B0604020202020204" pitchFamily="34" charset="0"/>
+              <a:buChar char="•"/>
+            </a:pPr>
+            <a:r>
+              <a:rPr lang="en-US" dirty="0"/>
+              <a:t>Throttling</a:t>
+            </a:r>
+          </a:p>
+          <a:p>
+            <a:pPr marL="171450" indent="-171450">
+              <a:buFont typeface="Arial" panose="020B0604020202020204" pitchFamily="34" charset="0"/>
+              <a:buChar char="•"/>
+            </a:pPr>
+            <a:r>
+              <a:rPr lang="en-US" dirty="0"/>
+              <a:t>Retries and business transactions to </a:t>
+            </a:r>
+            <a:r>
+              <a:rPr lang="en-US" dirty="0" err="1"/>
+              <a:t>stateful</a:t>
+            </a:r>
+            <a:r>
+              <a:rPr lang="en-US" dirty="0"/>
+              <a:t> </a:t>
+            </a:r>
+            <a:r>
+              <a:rPr lang="en-US" dirty="0" err="1"/>
+              <a:t>middletier</a:t>
+            </a:r>
+            <a:endParaRPr lang="en-US" dirty="0"/>
+          </a:p>
+          <a:p>
+            <a:pPr marL="171450" indent="-171450">
+              <a:buFont typeface="Arial" panose="020B0604020202020204" pitchFamily="34" charset="0"/>
+              <a:buChar char="•"/>
+            </a:pPr>
+            <a:r>
+              <a:rPr lang="en-US" dirty="0"/>
+              <a:t>Intent capturing request as messages</a:t>
+            </a:r>
+          </a:p>
+          <a:p>
+            <a:pPr marL="171450" indent="-171450">
+              <a:buFont typeface="Arial" panose="020B0604020202020204" pitchFamily="34" charset="0"/>
+              <a:buChar char="•"/>
+            </a:pPr>
+            <a:r>
+              <a:rPr lang="en-US" dirty="0"/>
+              <a:t>Reactive</a:t>
+            </a:r>
+          </a:p>
+          <a:p>
+            <a:pPr marL="171450" indent="-171450">
+              <a:buFont typeface="Arial" panose="020B0604020202020204" pitchFamily="34" charset="0"/>
+              <a:buChar char="•"/>
+            </a:pPr>
+            <a:r>
+              <a:rPr lang="en-US" dirty="0"/>
+              <a:t>Auditing of orders</a:t>
+            </a:r>
+            <a:endParaRPr lang="de-CH" dirty="0"/>
           </a:p>
         </p:txBody>
       </p:sp>
@@ -851,7 +855,7 @@
           <a:p>
             <a:fld id="{59E9685D-E391-4BCC-987B-6FB0218A8DB9}" type="slidenum">
               <a:rPr lang="en-US" smtClean="0"/>
-              <a:t>12</a:t>
+              <a:t>11</a:t>
             </a:fld>
             <a:endParaRPr lang="en-US"/>
           </a:p>
@@ -860,7 +864,7 @@
     </p:spTree>
     <p:extLst>
       <p:ext uri="{BB962C8B-B14F-4D97-AF65-F5344CB8AC3E}">
-        <p14:creationId xmlns:p14="http://schemas.microsoft.com/office/powerpoint/2010/main" val="2134601559"/>
+        <p14:creationId xmlns:p14="http://schemas.microsoft.com/office/powerpoint/2010/main" val="384687694"/>
       </p:ext>
     </p:extLst>
   </p:cSld>
@@ -914,6 +918,22 @@
           <a:bodyPr/>
           <a:lstStyle/>
           <a:p>
+            <a:r>
+              <a:rPr lang="en-US" dirty="0"/>
+              <a:t>The Frontend uses the OWIN startup listener to bootstrap the communication infrastructure with the queuing system</a:t>
+            </a:r>
+          </a:p>
+          <a:p>
+            <a:r>
+              <a:rPr lang="en-US" dirty="0"/>
+              <a:t>The front end only sends messages to the destination and doesn’t need to listen for messages itself in their architecture</a:t>
+            </a:r>
+          </a:p>
+          <a:p>
+            <a:r>
+              <a:rPr lang="en-US" dirty="0"/>
+              <a:t>The backend uses the communication listener to enable the queue listener since the backend is the part which processes orders</a:t>
+            </a:r>
             <a:endParaRPr lang="en-CH" dirty="0"/>
           </a:p>
         </p:txBody>
@@ -935,7 +955,7 @@
           <a:p>
             <a:fld id="{59E9685D-E391-4BCC-987B-6FB0218A8DB9}" type="slidenum">
               <a:rPr lang="en-US" smtClean="0"/>
-              <a:t>13</a:t>
+              <a:t>12</a:t>
             </a:fld>
             <a:endParaRPr lang="en-US"/>
           </a:p>
@@ -944,7 +964,7 @@
     </p:spTree>
     <p:extLst>
       <p:ext uri="{BB962C8B-B14F-4D97-AF65-F5344CB8AC3E}">
-        <p14:creationId xmlns:p14="http://schemas.microsoft.com/office/powerpoint/2010/main" val="1389148261"/>
+        <p14:creationId xmlns:p14="http://schemas.microsoft.com/office/powerpoint/2010/main" val="2134601559"/>
       </p:ext>
     </p:extLst>
   </p:cSld>
@@ -1000,26 +1020,9 @@
           <a:p>
             <a:r>
               <a:rPr lang="en-US" dirty="0"/>
-              <a:t>Let’s see what the team came up with.</a:t>
-            </a:r>
-          </a:p>
-          <a:p>
-            <a:endParaRPr lang="en-US" dirty="0"/>
-          </a:p>
-          <a:p>
-            <a:r>
-              <a:rPr lang="en-US" dirty="0"/>
-              <a:t>The team decided to use </a:t>
-            </a:r>
-            <a:r>
-              <a:rPr lang="en-US" dirty="0" err="1"/>
-              <a:t>NServiceBus</a:t>
-            </a:r>
-            <a:r>
-              <a:rPr lang="en-US" dirty="0"/>
-              <a:t> because they wanted to focus on the business logic, use a framework that is battle tested, not write plumbing code and work with a company that provides world class enterprise support</a:t>
-            </a:r>
-            <a:endParaRPr lang="de-CH" dirty="0"/>
+              <a:t>With the scaled out approach multiple instances of the front end will send orders to the queue while multiple competing consumers will fetch messages from the queuing system on the backend. So with each backend instance we can essentially linearly scale the backend processing power up to the capacity of the queuing system</a:t>
+            </a:r>
+            <a:endParaRPr lang="en-CH" dirty="0"/>
           </a:p>
         </p:txBody>
       </p:sp>
@@ -1038,18 +1041,18 @@
           <a:bodyPr/>
           <a:lstStyle/>
           <a:p>
-            <a:fld id="{9BCA07FD-5BD5-4529-84B0-48DD2C561176}" type="slidenum">
-              <a:rPr lang="de-CH" smtClean="0"/>
-              <a:t>14</a:t>
+            <a:fld id="{59E9685D-E391-4BCC-987B-6FB0218A8DB9}" type="slidenum">
+              <a:rPr lang="en-US" smtClean="0"/>
+              <a:t>13</a:t>
             </a:fld>
-            <a:endParaRPr lang="de-CH"/>
+            <a:endParaRPr lang="en-US"/>
           </a:p>
         </p:txBody>
       </p:sp>
     </p:spTree>
     <p:extLst>
       <p:ext uri="{BB962C8B-B14F-4D97-AF65-F5344CB8AC3E}">
-        <p14:creationId xmlns:p14="http://schemas.microsoft.com/office/powerpoint/2010/main" val="3499554749"/>
+        <p14:creationId xmlns:p14="http://schemas.microsoft.com/office/powerpoint/2010/main" val="1389148261"/>
       </p:ext>
     </p:extLst>
   </p:cSld>
@@ -1105,7 +1108,7 @@
           <a:p>
             <a:r>
               <a:rPr lang="en-US" dirty="0"/>
-              <a:t>The solution was working well for the team. The reduced temporal coupling, the retries and the throttling capabilities it the system really robust and stable. One problem remained though</a:t>
+              <a:t>Let’s see what the team came up with.</a:t>
             </a:r>
           </a:p>
           <a:p>
@@ -1114,43 +1117,17 @@
           <a:p>
             <a:r>
               <a:rPr lang="en-US" dirty="0"/>
-              <a:t>(Click)</a:t>
-            </a:r>
-          </a:p>
-          <a:p>
-            <a:endParaRPr lang="en-US" dirty="0"/>
-          </a:p>
-          <a:p>
+              <a:t>The team decided to use </a:t>
+            </a:r>
+            <a:r>
+              <a:rPr lang="en-US" dirty="0" err="1"/>
+              <a:t>NServiceBus</a:t>
+            </a:r>
             <a:r>
               <a:rPr lang="en-US" dirty="0"/>
-              <a:t>The realized with the increased demand in Swiss chocolate their scaling needs starting to grow and grow. The storage layer become more and more the bottleneck because it had to be consulted on every request from the query side but also from the command handling side. The team started to think about adding a caching layer between the storage tier and the backend to achieve the required hyperscale. </a:t>
-            </a:r>
-          </a:p>
-          <a:p>
-            <a:endParaRPr lang="en-US" dirty="0"/>
-          </a:p>
-          <a:p>
-            <a:r>
-              <a:rPr lang="en-US" dirty="0"/>
-              <a:t>When they started talking about caches they realized that cache invalidation is an immensely complex problem and requires usually a consensus approach to keep it current and up to date. With a caching layer they would potentially also loose the transactional semantics of the storage layer but then the remember that Service Fabric has built in partitioning and reliable collections that comes with </a:t>
-            </a:r>
-            <a:r>
-              <a:rPr lang="en-US" dirty="0" err="1"/>
-              <a:t>stateful</a:t>
-            </a:r>
-            <a:r>
-              <a:rPr lang="en-US" dirty="0"/>
-              <a:t> services.</a:t>
-            </a:r>
-          </a:p>
-          <a:p>
-            <a:endParaRPr lang="en-US" dirty="0"/>
-          </a:p>
-          <a:p>
-            <a:r>
-              <a:rPr lang="en-US" dirty="0"/>
-              <a:t>(next)</a:t>
-            </a:r>
+              <a:t> because they wanted to focus on the business logic, use a framework that is battle tested, not write plumbing code and work with a company that provides world class enterprise support</a:t>
+            </a:r>
+            <a:endParaRPr lang="de-CH" dirty="0"/>
           </a:p>
         </p:txBody>
       </p:sp>
@@ -1171,7 +1148,7 @@
           <a:p>
             <a:fld id="{9BCA07FD-5BD5-4529-84B0-48DD2C561176}" type="slidenum">
               <a:rPr lang="de-CH" smtClean="0"/>
-              <a:t>15</a:t>
+              <a:t>14</a:t>
             </a:fld>
             <a:endParaRPr lang="de-CH"/>
           </a:p>
@@ -1180,7 +1157,7 @@
     </p:spTree>
     <p:extLst>
       <p:ext uri="{BB962C8B-B14F-4D97-AF65-F5344CB8AC3E}">
-        <p14:creationId xmlns:p14="http://schemas.microsoft.com/office/powerpoint/2010/main" val="540667484"/>
+        <p14:creationId xmlns:p14="http://schemas.microsoft.com/office/powerpoint/2010/main" val="3499554749"/>
       </p:ext>
     </p:extLst>
   </p:cSld>
@@ -1236,7 +1213,34 @@
           <a:p>
             <a:r>
               <a:rPr lang="en-US" dirty="0"/>
-              <a:t>Concept of </a:t>
+              <a:t>The solution was working well for the team. The reduced temporal coupling, the retries and the throttling capabilities it the system really robust and stable. One problem remained though</a:t>
+            </a:r>
+          </a:p>
+          <a:p>
+            <a:endParaRPr lang="en-US" dirty="0"/>
+          </a:p>
+          <a:p>
+            <a:r>
+              <a:rPr lang="en-US" dirty="0"/>
+              <a:t>(Click)</a:t>
+            </a:r>
+          </a:p>
+          <a:p>
+            <a:endParaRPr lang="en-US" dirty="0"/>
+          </a:p>
+          <a:p>
+            <a:r>
+              <a:rPr lang="en-US" dirty="0"/>
+              <a:t>The realized with the increased demand in Swiss chocolate their scaling needs starting to grow and grow. The storage layer become more and more the bottleneck because it had to be consulted on every request from the query side but also from the command handling side. The team started to think about adding a caching layer between the storage tier and the backend to achieve the required hyperscale. </a:t>
+            </a:r>
+          </a:p>
+          <a:p>
+            <a:endParaRPr lang="en-US" dirty="0"/>
+          </a:p>
+          <a:p>
+            <a:r>
+              <a:rPr lang="en-US" dirty="0"/>
+              <a:t>When they started talking about caches they realized that cache invalidation is an immensely complex problem and requires usually a consensus approach to keep it current and up to date. With a caching layer they would potentially also loose the transactional semantics of the storage layer but then the remember that Service Fabric has built in partitioning and reliable collections that comes with </a:t>
             </a:r>
             <a:r>
               <a:rPr lang="en-US" dirty="0" err="1"/>
@@ -1244,107 +1248,17 @@
             </a:r>
             <a:r>
               <a:rPr lang="en-US" dirty="0"/>
-              <a:t> services, </a:t>
-            </a:r>
-            <a:r>
-              <a:rPr lang="en-US" dirty="0" err="1"/>
-              <a:t>Stateful</a:t>
-            </a:r>
+              <a:t> services.</a:t>
+            </a:r>
+          </a:p>
+          <a:p>
+            <a:endParaRPr lang="en-US" dirty="0"/>
+          </a:p>
+          <a:p>
             <a:r>
               <a:rPr lang="en-US" dirty="0"/>
-              <a:t> Services allow to consistently and reliably store state right inside the service by leveraging the power of reliable collections. They have a similar API to C# collections but are offer transactional semantics as well as replication inside the cluster. With that we can achieve:</a:t>
-            </a:r>
-          </a:p>
-          <a:p>
-            <a:endParaRPr lang="en-US" dirty="0"/>
-          </a:p>
-          <a:p>
-            <a:r>
-              <a:rPr lang="en-US" dirty="0"/>
-              <a:t>Application hot state lives in the compute tier</a:t>
-            </a:r>
-          </a:p>
-          <a:p>
-            <a:r>
-              <a:rPr lang="en-US" dirty="0"/>
-              <a:t>Low latency reads and writes</a:t>
-            </a:r>
-          </a:p>
-          <a:p>
-            <a:r>
-              <a:rPr lang="en-US" dirty="0"/>
-              <a:t>Transactional</a:t>
-            </a:r>
-          </a:p>
-          <a:p>
-            <a:r>
-              <a:rPr lang="en-US" dirty="0"/>
-              <a:t>Fewer moving parts</a:t>
-            </a:r>
-          </a:p>
-          <a:p>
-            <a:r>
-              <a:rPr lang="en-US" dirty="0"/>
-              <a:t>External stores are only used for exhaust and offline analytics</a:t>
-            </a:r>
-          </a:p>
-          <a:p>
-            <a:r>
-              <a:rPr lang="en-US" dirty="0"/>
-              <a:t>Capacity in cluster is limited compared to the storage tier (tradeoff)</a:t>
-            </a:r>
-          </a:p>
-          <a:p>
-            <a:r>
-              <a:rPr lang="en-US" dirty="0"/>
-              <a:t>Mention orders in memory</a:t>
-            </a:r>
-          </a:p>
-          <a:p>
-            <a:endParaRPr lang="en-US" dirty="0"/>
-          </a:p>
-          <a:p>
-            <a:r>
-              <a:rPr lang="en-US" dirty="0"/>
-              <a:t>Conceptually, you can think about a partition of a </a:t>
-            </a:r>
-            <a:r>
-              <a:rPr lang="en-US" dirty="0" err="1"/>
-              <a:t>stateful</a:t>
-            </a:r>
-            <a:r>
-              <a:rPr lang="en-US" dirty="0"/>
-              <a:t> service as a scale unit that is highly reliable through replicas that are distributed and balanced across the nodes in a cluster.</a:t>
-            </a:r>
-          </a:p>
-          <a:p>
-            <a:r>
-              <a:rPr lang="en-US" dirty="0"/>
-              <a:t>Partitioning in the context of Service Fabric </a:t>
-            </a:r>
-            <a:r>
-              <a:rPr lang="en-US" dirty="0" err="1"/>
-              <a:t>stateful</a:t>
-            </a:r>
-            <a:r>
-              <a:rPr lang="en-US" dirty="0"/>
-              <a:t> services refers to the process of determining that a particular service partition is responsible for a portion of the complete state of the service. </a:t>
-            </a:r>
-          </a:p>
-          <a:p>
-            <a:r>
-              <a:rPr lang="en-US" dirty="0"/>
-              <a:t>A great thing about Service Fabric is that it places the partitions on different nodes. </a:t>
-            </a:r>
-          </a:p>
-          <a:p>
-            <a:r>
-              <a:rPr lang="en-US" dirty="0"/>
-              <a:t>This allows them to grow to a node's resource limit. As the data needs grow, partitions grow, and Service Fabric rebalances partitions across nodes. This ensures the continued efficient use of hardware resources.</a:t>
-            </a:r>
-          </a:p>
-          <a:p>
-            <a:endParaRPr lang="en-CH" dirty="0"/>
+              <a:t>(next)</a:t>
+            </a:r>
           </a:p>
         </p:txBody>
       </p:sp>
@@ -1363,18 +1277,18 @@
           <a:bodyPr/>
           <a:lstStyle/>
           <a:p>
-            <a:fld id="{59E9685D-E391-4BCC-987B-6FB0218A8DB9}" type="slidenum">
-              <a:rPr lang="en-US" smtClean="0"/>
-              <a:t>16</a:t>
+            <a:fld id="{9BCA07FD-5BD5-4529-84B0-48DD2C561176}" type="slidenum">
+              <a:rPr lang="de-CH" smtClean="0"/>
+              <a:t>15</a:t>
             </a:fld>
-            <a:endParaRPr lang="en-US"/>
+            <a:endParaRPr lang="de-CH"/>
           </a:p>
         </p:txBody>
       </p:sp>
     </p:spTree>
     <p:extLst>
       <p:ext uri="{BB962C8B-B14F-4D97-AF65-F5344CB8AC3E}">
-        <p14:creationId xmlns:p14="http://schemas.microsoft.com/office/powerpoint/2010/main" val="2574057860"/>
+        <p14:creationId xmlns:p14="http://schemas.microsoft.com/office/powerpoint/2010/main" val="540667484"/>
       </p:ext>
     </p:extLst>
   </p:cSld>
@@ -1430,7 +1344,7 @@
           <a:p>
             <a:r>
               <a:rPr lang="en-US" dirty="0"/>
-              <a:t>They decided to address this and started building their new solution with a </a:t>
+              <a:t>Concept of </a:t>
             </a:r>
             <a:r>
               <a:rPr lang="en-US" dirty="0" err="1"/>
@@ -1438,9 +1352,107 @@
             </a:r>
             <a:r>
               <a:rPr lang="en-US" dirty="0"/>
-              <a:t> backend using reliable collections</a:t>
-            </a:r>
-            <a:endParaRPr lang="de-CH" dirty="0"/>
+              <a:t> services, </a:t>
+            </a:r>
+            <a:r>
+              <a:rPr lang="en-US" dirty="0" err="1"/>
+              <a:t>Stateful</a:t>
+            </a:r>
+            <a:r>
+              <a:rPr lang="en-US" dirty="0"/>
+              <a:t> Services allow to consistently and reliably store state right inside the service by leveraging the power of reliable collections. They have a similar API to C# collections but are offer transactional semantics as well as replication inside the cluster. With that we can achieve:</a:t>
+            </a:r>
+          </a:p>
+          <a:p>
+            <a:endParaRPr lang="en-US" dirty="0"/>
+          </a:p>
+          <a:p>
+            <a:r>
+              <a:rPr lang="en-US" dirty="0"/>
+              <a:t>Application hot state lives in the compute tier</a:t>
+            </a:r>
+          </a:p>
+          <a:p>
+            <a:r>
+              <a:rPr lang="en-US" dirty="0"/>
+              <a:t>Low latency reads and writes</a:t>
+            </a:r>
+          </a:p>
+          <a:p>
+            <a:r>
+              <a:rPr lang="en-US" dirty="0"/>
+              <a:t>Transactional</a:t>
+            </a:r>
+          </a:p>
+          <a:p>
+            <a:r>
+              <a:rPr lang="en-US" dirty="0"/>
+              <a:t>Fewer moving parts</a:t>
+            </a:r>
+          </a:p>
+          <a:p>
+            <a:r>
+              <a:rPr lang="en-US" dirty="0"/>
+              <a:t>External stores are only used for exhaust and offline analytics</a:t>
+            </a:r>
+          </a:p>
+          <a:p>
+            <a:r>
+              <a:rPr lang="en-US" dirty="0"/>
+              <a:t>Capacity in cluster is limited compared to the storage tier (tradeoff)</a:t>
+            </a:r>
+          </a:p>
+          <a:p>
+            <a:r>
+              <a:rPr lang="en-US" dirty="0"/>
+              <a:t>Mention orders in memory</a:t>
+            </a:r>
+          </a:p>
+          <a:p>
+            <a:endParaRPr lang="en-US" dirty="0"/>
+          </a:p>
+          <a:p>
+            <a:r>
+              <a:rPr lang="en-US" dirty="0"/>
+              <a:t>Conceptually, you can think about a partition of a </a:t>
+            </a:r>
+            <a:r>
+              <a:rPr lang="en-US" dirty="0" err="1"/>
+              <a:t>stateful</a:t>
+            </a:r>
+            <a:r>
+              <a:rPr lang="en-US" dirty="0"/>
+              <a:t> service as a scale unit that is highly reliable through replicas that are distributed and balanced across the nodes in a cluster.</a:t>
+            </a:r>
+          </a:p>
+          <a:p>
+            <a:r>
+              <a:rPr lang="en-US" dirty="0"/>
+              <a:t>Partitioning in the context of Service Fabric </a:t>
+            </a:r>
+            <a:r>
+              <a:rPr lang="en-US" dirty="0" err="1"/>
+              <a:t>stateful</a:t>
+            </a:r>
+            <a:r>
+              <a:rPr lang="en-US" dirty="0"/>
+              <a:t> services refers to the process of determining that a particular service partition is responsible for a portion of the complete state of the service. </a:t>
+            </a:r>
+          </a:p>
+          <a:p>
+            <a:r>
+              <a:rPr lang="en-US" dirty="0"/>
+              <a:t>A great thing about Service Fabric is that it places the partitions on different nodes. </a:t>
+            </a:r>
+          </a:p>
+          <a:p>
+            <a:r>
+              <a:rPr lang="en-US" dirty="0"/>
+              <a:t>This allows them to grow to a node's resource limit. As the data needs grow, partitions grow, and Service Fabric rebalances partitions across nodes. This ensures the continued efficient use of hardware resources.</a:t>
+            </a:r>
+          </a:p>
+          <a:p>
+            <a:endParaRPr lang="en-CH" dirty="0"/>
           </a:p>
         </p:txBody>
       </p:sp>
@@ -1459,18 +1471,18 @@
           <a:bodyPr/>
           <a:lstStyle/>
           <a:p>
-            <a:fld id="{9BCA07FD-5BD5-4529-84B0-48DD2C561176}" type="slidenum">
-              <a:rPr lang="de-CH" smtClean="0"/>
-              <a:t>17</a:t>
+            <a:fld id="{59E9685D-E391-4BCC-987B-6FB0218A8DB9}" type="slidenum">
+              <a:rPr lang="en-US" smtClean="0"/>
+              <a:t>16</a:t>
             </a:fld>
-            <a:endParaRPr lang="de-CH"/>
+            <a:endParaRPr lang="en-US"/>
           </a:p>
         </p:txBody>
       </p:sp>
     </p:spTree>
     <p:extLst>
       <p:ext uri="{BB962C8B-B14F-4D97-AF65-F5344CB8AC3E}">
-        <p14:creationId xmlns:p14="http://schemas.microsoft.com/office/powerpoint/2010/main" val="3667239180"/>
+        <p14:creationId xmlns:p14="http://schemas.microsoft.com/office/powerpoint/2010/main" val="2574057860"/>
       </p:ext>
     </p:extLst>
   </p:cSld>
@@ -1524,6 +1536,18 @@
           <a:bodyPr/>
           <a:lstStyle/>
           <a:p>
+            <a:r>
+              <a:rPr lang="en-US" dirty="0"/>
+              <a:t>They decided to address this and started building their new solution with a </a:t>
+            </a:r>
+            <a:r>
+              <a:rPr lang="en-US" dirty="0" err="1"/>
+              <a:t>stateful</a:t>
+            </a:r>
+            <a:r>
+              <a:rPr lang="en-US" dirty="0"/>
+              <a:t> backend using reliable collections</a:t>
+            </a:r>
             <a:endParaRPr lang="de-CH" dirty="0"/>
           </a:p>
         </p:txBody>
@@ -1543,18 +1567,18 @@
           <a:bodyPr/>
           <a:lstStyle/>
           <a:p>
-            <a:fld id="{59E9685D-E391-4BCC-987B-6FB0218A8DB9}" type="slidenum">
-              <a:rPr lang="en-US" smtClean="0"/>
-              <a:t>18</a:t>
+            <a:fld id="{9BCA07FD-5BD5-4529-84B0-48DD2C561176}" type="slidenum">
+              <a:rPr lang="de-CH" smtClean="0"/>
+              <a:t>17</a:t>
             </a:fld>
-            <a:endParaRPr lang="en-US"/>
+            <a:endParaRPr lang="de-CH"/>
           </a:p>
         </p:txBody>
       </p:sp>
     </p:spTree>
     <p:extLst>
       <p:ext uri="{BB962C8B-B14F-4D97-AF65-F5344CB8AC3E}">
-        <p14:creationId xmlns:p14="http://schemas.microsoft.com/office/powerpoint/2010/main" val="1442031213"/>
+        <p14:creationId xmlns:p14="http://schemas.microsoft.com/office/powerpoint/2010/main" val="3667239180"/>
       </p:ext>
     </p:extLst>
   </p:cSld>
@@ -1627,18 +1651,18 @@
           <a:bodyPr/>
           <a:lstStyle/>
           <a:p>
-            <a:fld id="{9BCA07FD-5BD5-4529-84B0-48DD2C561176}" type="slidenum">
-              <a:rPr lang="de-CH" smtClean="0"/>
-              <a:t>19</a:t>
+            <a:fld id="{59E9685D-E391-4BCC-987B-6FB0218A8DB9}" type="slidenum">
+              <a:rPr lang="en-US" smtClean="0"/>
+              <a:t>18</a:t>
             </a:fld>
-            <a:endParaRPr lang="de-CH"/>
+            <a:endParaRPr lang="en-US"/>
           </a:p>
         </p:txBody>
       </p:sp>
     </p:spTree>
     <p:extLst>
       <p:ext uri="{BB962C8B-B14F-4D97-AF65-F5344CB8AC3E}">
-        <p14:creationId xmlns:p14="http://schemas.microsoft.com/office/powerpoint/2010/main" val="1924394181"/>
+        <p14:creationId xmlns:p14="http://schemas.microsoft.com/office/powerpoint/2010/main" val="1442031213"/>
       </p:ext>
     </p:extLst>
   </p:cSld>
@@ -1692,100 +1716,6 @@
           <a:bodyPr/>
           <a:lstStyle/>
           <a:p>
-            <a:r>
-              <a:rPr lang="en-US" dirty="0"/>
-              <a:t>The UI composite for issuing orders in the order management microservice will issue a command to the order backend part. </a:t>
-            </a:r>
-          </a:p>
-          <a:p>
-            <a:r>
-              <a:rPr lang="en-US" dirty="0"/>
-              <a:t>Since they belong to the same bounded context it is OK to use commands. </a:t>
-            </a:r>
-          </a:p>
-          <a:p>
-            <a:r>
-              <a:rPr lang="en-US" dirty="0"/>
-              <a:t>When sending a commend the sender knows the receiver or at least the logical destination (here the queue). With that we can decouple the order sending temporarily from the order receiving. </a:t>
-            </a:r>
-          </a:p>
-          <a:p>
-            <a:r>
-              <a:rPr lang="en-US" dirty="0"/>
-              <a:t>In that case it is OK for the sender to know the data partition function the maps the input data to the partition key. </a:t>
-            </a:r>
-          </a:p>
-          <a:p>
-            <a:endParaRPr lang="en-US" dirty="0"/>
-          </a:p>
-          <a:p>
-            <a:pPr marL="0" marR="0" lvl="0" indent="0" algn="l" defTabSz="914400" rtl="0" eaLnBrk="1" fontAlgn="auto" latinLnBrk="0" hangingPunct="1">
-              <a:lnSpc>
-                <a:spcPct val="100000"/>
-              </a:lnSpc>
-              <a:spcBef>
-                <a:spcPts val="0"/>
-              </a:spcBef>
-              <a:spcAft>
-                <a:spcPts val="0"/>
-              </a:spcAft>
-              <a:buClrTx/>
-              <a:buSzTx/>
-              <a:buFontTx/>
-              <a:buNone/>
-              <a:tabLst/>
-              <a:defRPr/>
-            </a:pPr>
-            <a:r>
-              <a:rPr lang="en-US" dirty="0"/>
-              <a:t>Integration scenarios, a command sender is not part of the cluster but still belongs to the same bounded context</a:t>
-            </a:r>
-          </a:p>
-          <a:p>
-            <a:pPr marL="0" marR="0" lvl="0" indent="0" algn="l" defTabSz="914400" rtl="0" eaLnBrk="1" fontAlgn="auto" latinLnBrk="0" hangingPunct="1">
-              <a:lnSpc>
-                <a:spcPct val="100000"/>
-              </a:lnSpc>
-              <a:spcBef>
-                <a:spcPts val="0"/>
-              </a:spcBef>
-              <a:spcAft>
-                <a:spcPts val="0"/>
-              </a:spcAft>
-              <a:buClrTx/>
-              <a:buSzTx/>
-              <a:buFontTx/>
-              <a:buNone/>
-              <a:tabLst/>
-              <a:defRPr/>
-            </a:pPr>
-            <a:endParaRPr lang="en-US" dirty="0"/>
-          </a:p>
-          <a:p>
-            <a:pPr marL="0" marR="0" lvl="0" indent="0" algn="l" defTabSz="914400" rtl="0" eaLnBrk="1" fontAlgn="auto" latinLnBrk="0" hangingPunct="1">
-              <a:lnSpc>
-                <a:spcPct val="100000"/>
-              </a:lnSpc>
-              <a:spcBef>
-                <a:spcPts val="0"/>
-              </a:spcBef>
-              <a:spcAft>
-                <a:spcPts val="0"/>
-              </a:spcAft>
-              <a:buClrTx/>
-              <a:buSzTx/>
-              <a:buFontTx/>
-              <a:buNone/>
-              <a:tabLst/>
-              <a:defRPr/>
-            </a:pPr>
-            <a:r>
-              <a:rPr lang="en-US" dirty="0"/>
-              <a:t>For simplicity reasons let’s call this Sender Side Distribution.</a:t>
-            </a:r>
-            <a:endParaRPr lang="de-CH" dirty="0"/>
-          </a:p>
-          <a:p>
             <a:endParaRPr lang="de-CH" dirty="0"/>
           </a:p>
         </p:txBody>
@@ -1807,7 +1737,7 @@
           <a:p>
             <a:fld id="{9BCA07FD-5BD5-4529-84B0-48DD2C561176}" type="slidenum">
               <a:rPr lang="de-CH" smtClean="0"/>
-              <a:t>20</a:t>
+              <a:t>19</a:t>
             </a:fld>
             <a:endParaRPr lang="de-CH"/>
           </a:p>
@@ -1816,7 +1746,7 @@
     </p:spTree>
     <p:extLst>
       <p:ext uri="{BB962C8B-B14F-4D97-AF65-F5344CB8AC3E}">
-        <p14:creationId xmlns:p14="http://schemas.microsoft.com/office/powerpoint/2010/main" val="3289565515"/>
+        <p14:creationId xmlns:p14="http://schemas.microsoft.com/office/powerpoint/2010/main" val="1924394181"/>
       </p:ext>
     </p:extLst>
   </p:cSld>
@@ -1995,67 +1925,99 @@
           <a:p>
             <a:r>
               <a:rPr lang="en-US" dirty="0"/>
-              <a:t>For </a:t>
-            </a:r>
-            <a:r>
-              <a:rPr lang="en-US" dirty="0" err="1"/>
-              <a:t>PubSub</a:t>
-            </a:r>
+              <a:t>The UI composite for issuing orders in the order management microservice will issue a command to the order backend part. </a:t>
+            </a:r>
+          </a:p>
+          <a:p>
             <a:r>
               <a:rPr lang="en-US" dirty="0"/>
-              <a:t> the subscriber is abstracted behind a logical thing like a logical queue or a topic or exchange. </a:t>
+              <a:t>Since they belong to the same bounded context it is OK to use commands. </a:t>
             </a:r>
           </a:p>
           <a:p>
             <a:r>
               <a:rPr lang="en-US" dirty="0"/>
-              <a:t>The fact that a subscriber is scaled out is not visible to the publisher. </a:t>
+              <a:t>When sending a commend the sender knows the receiver or at least the logical destination (here the queue). With that we can decouple the order sending temporarily from the order receiving. </a:t>
             </a:r>
           </a:p>
           <a:p>
             <a:r>
               <a:rPr lang="en-US" dirty="0"/>
-              <a:t>For non-data replication scenarios usually a single physical subscriber of a logical group gets the event. </a:t>
-            </a:r>
-          </a:p>
-          <a:p>
+              <a:t>In that case it is OK for the sender to know the data partition function the maps the input data to the partition key. </a:t>
+            </a:r>
+          </a:p>
+          <a:p>
+            <a:endParaRPr lang="en-US" dirty="0"/>
+          </a:p>
+          <a:p>
+            <a:pPr marL="0" marR="0" lvl="0" indent="0" algn="l" defTabSz="914400" rtl="0" eaLnBrk="1" fontAlgn="auto" latinLnBrk="0" hangingPunct="1">
+              <a:lnSpc>
+                <a:spcPct val="100000"/>
+              </a:lnSpc>
+              <a:spcBef>
+                <a:spcPts val="0"/>
+              </a:spcBef>
+              <a:spcAft>
+                <a:spcPts val="0"/>
+              </a:spcAft>
+              <a:buClrTx/>
+              <a:buSzTx/>
+              <a:buFontTx/>
+              <a:buNone/>
+              <a:tabLst/>
+              <a:defRPr/>
+            </a:pPr>
             <a:r>
               <a:rPr lang="en-US" dirty="0"/>
-              <a:t>Since they act as competing consumers a message can be picked up by any subscriber. The subscriber then recalculates the data partition key by using its internal data partitioning function.</a:t>
-            </a:r>
-          </a:p>
-          <a:p>
+              <a:t>Integration scenarios, a command sender is not part of the cluster but still belongs to the same bounded context</a:t>
+            </a:r>
+          </a:p>
+          <a:p>
+            <a:pPr marL="0" marR="0" lvl="0" indent="0" algn="l" defTabSz="914400" rtl="0" eaLnBrk="1" fontAlgn="auto" latinLnBrk="0" hangingPunct="1">
+              <a:lnSpc>
+                <a:spcPct val="100000"/>
+              </a:lnSpc>
+              <a:spcBef>
+                <a:spcPts val="0"/>
+              </a:spcBef>
+              <a:spcAft>
+                <a:spcPts val="0"/>
+              </a:spcAft>
+              <a:buClrTx/>
+              <a:buSzTx/>
+              <a:buFontTx/>
+              <a:buNone/>
+              <a:tabLst/>
+              <a:defRPr/>
+            </a:pPr>
+            <a:endParaRPr lang="en-US" dirty="0"/>
+          </a:p>
+          <a:p>
+            <a:pPr marL="0" marR="0" lvl="0" indent="0" algn="l" defTabSz="914400" rtl="0" eaLnBrk="1" fontAlgn="auto" latinLnBrk="0" hangingPunct="1">
+              <a:lnSpc>
+                <a:spcPct val="100000"/>
+              </a:lnSpc>
+              <a:spcBef>
+                <a:spcPts val="0"/>
+              </a:spcBef>
+              <a:spcAft>
+                <a:spcPts val="0"/>
+              </a:spcAft>
+              <a:buClrTx/>
+              <a:buSzTx/>
+              <a:buFontTx/>
+              <a:buNone/>
+              <a:tabLst/>
+              <a:defRPr/>
+            </a:pPr>
             <a:r>
               <a:rPr lang="en-US" dirty="0"/>
-              <a:t>If the key matches the current partition everything is good. If not the event is internally rerouted with a single hop.</a:t>
-            </a:r>
-          </a:p>
-          <a:p>
-            <a:endParaRPr lang="en-US" dirty="0"/>
-          </a:p>
-          <a:p>
-            <a:r>
-              <a:rPr lang="en-US" dirty="0"/>
-              <a:t>(click)</a:t>
-            </a:r>
-          </a:p>
-          <a:p>
-            <a:endParaRPr lang="en-US" dirty="0"/>
-          </a:p>
-          <a:p>
-            <a:r>
-              <a:rPr lang="en-US" dirty="0"/>
-              <a:t>To keep it aligned with Peters lingo let’s call this receiver side distribution although I know this is not an official term!</a:t>
-            </a:r>
-          </a:p>
-          <a:p>
-            <a:endParaRPr lang="en-US" dirty="0"/>
-          </a:p>
-          <a:p>
-            <a:r>
-              <a:rPr lang="en-US" dirty="0"/>
-              <a:t>Even when publisher is its own subscriber this has to be applied</a:t>
-            </a:r>
+              <a:t>For simplicity reasons let’s call this Sender Side Distribution.</a:t>
+            </a:r>
+            <a:endParaRPr lang="de-CH" dirty="0"/>
+          </a:p>
+          <a:p>
+            <a:endParaRPr lang="de-CH" dirty="0"/>
           </a:p>
         </p:txBody>
       </p:sp>
@@ -2076,7 +2038,7 @@
           <a:p>
             <a:fld id="{9BCA07FD-5BD5-4529-84B0-48DD2C561176}" type="slidenum">
               <a:rPr lang="de-CH" smtClean="0"/>
-              <a:t>21</a:t>
+              <a:t>20</a:t>
             </a:fld>
             <a:endParaRPr lang="de-CH"/>
           </a:p>
@@ -2085,7 +2047,7 @@
     </p:spTree>
     <p:extLst>
       <p:ext uri="{BB962C8B-B14F-4D97-AF65-F5344CB8AC3E}">
-        <p14:creationId xmlns:p14="http://schemas.microsoft.com/office/powerpoint/2010/main" val="3215427536"/>
+        <p14:creationId xmlns:p14="http://schemas.microsoft.com/office/powerpoint/2010/main" val="3289565515"/>
       </p:ext>
     </p:extLst>
   </p:cSld>
@@ -2141,7 +2103,66 @@
           <a:p>
             <a:r>
               <a:rPr lang="en-US" dirty="0"/>
-              <a:t>Let’s see what the team came up with.</a:t>
+              <a:t>For </a:t>
+            </a:r>
+            <a:r>
+              <a:rPr lang="en-US" dirty="0" err="1"/>
+              <a:t>PubSub</a:t>
+            </a:r>
+            <a:r>
+              <a:rPr lang="en-US" dirty="0"/>
+              <a:t> the subscriber is abstracted behind a logical thing like a logical queue or a topic or exchange. </a:t>
+            </a:r>
+          </a:p>
+          <a:p>
+            <a:r>
+              <a:rPr lang="en-US" dirty="0"/>
+              <a:t>The fact that a subscriber is scaled out is not visible to the publisher. </a:t>
+            </a:r>
+          </a:p>
+          <a:p>
+            <a:r>
+              <a:rPr lang="en-US" dirty="0"/>
+              <a:t>For non-data replication scenarios usually a single physical subscriber of a logical group gets the event. </a:t>
+            </a:r>
+          </a:p>
+          <a:p>
+            <a:r>
+              <a:rPr lang="en-US" dirty="0"/>
+              <a:t>Since they act as competing consumers a message can be picked up by any subscriber. The subscriber then recalculates the data partition key by using its internal data partitioning function.</a:t>
+            </a:r>
+          </a:p>
+          <a:p>
+            <a:r>
+              <a:rPr lang="en-US" dirty="0"/>
+              <a:t>If the key matches the current partition everything is good. If not the event is internally rerouted with a single hop.</a:t>
+            </a:r>
+          </a:p>
+          <a:p>
+            <a:endParaRPr lang="en-US" dirty="0"/>
+          </a:p>
+          <a:p>
+            <a:r>
+              <a:rPr lang="en-US" dirty="0"/>
+              <a:t>(click)</a:t>
+            </a:r>
+          </a:p>
+          <a:p>
+            <a:endParaRPr lang="en-US" dirty="0"/>
+          </a:p>
+          <a:p>
+            <a:r>
+              <a:rPr lang="en-US" dirty="0"/>
+              <a:t>To keep it aligned with Peters lingo let’s call this receiver side distribution although I know this is not an official term!</a:t>
+            </a:r>
+          </a:p>
+          <a:p>
+            <a:endParaRPr lang="en-US" dirty="0"/>
+          </a:p>
+          <a:p>
+            <a:r>
+              <a:rPr lang="en-US" dirty="0"/>
+              <a:t>Even when publisher is its own subscriber this has to be applied</a:t>
             </a:r>
           </a:p>
         </p:txBody>
@@ -2163,7 +2184,7 @@
           <a:p>
             <a:fld id="{9BCA07FD-5BD5-4529-84B0-48DD2C561176}" type="slidenum">
               <a:rPr lang="de-CH" smtClean="0"/>
-              <a:t>22</a:t>
+              <a:t>21</a:t>
             </a:fld>
             <a:endParaRPr lang="de-CH"/>
           </a:p>
@@ -2172,7 +2193,7 @@
     </p:spTree>
     <p:extLst>
       <p:ext uri="{BB962C8B-B14F-4D97-AF65-F5344CB8AC3E}">
-        <p14:creationId xmlns:p14="http://schemas.microsoft.com/office/powerpoint/2010/main" val="2216476395"/>
+        <p14:creationId xmlns:p14="http://schemas.microsoft.com/office/powerpoint/2010/main" val="3215427536"/>
       </p:ext>
     </p:extLst>
   </p:cSld>
@@ -2228,9 +2249,8 @@
           <a:p>
             <a:r>
               <a:rPr lang="en-US" dirty="0"/>
-              <a:t>Questions that can be answered in blog posts</a:t>
-            </a:r>
-            <a:endParaRPr lang="de-CH" dirty="0"/>
+              <a:t>Let’s see what the team came up with.</a:t>
+            </a:r>
           </a:p>
         </p:txBody>
       </p:sp>
@@ -2251,7 +2271,7 @@
           <a:p>
             <a:fld id="{9BCA07FD-5BD5-4529-84B0-48DD2C561176}" type="slidenum">
               <a:rPr lang="de-CH" smtClean="0"/>
-              <a:t>23</a:t>
+              <a:t>22</a:t>
             </a:fld>
             <a:endParaRPr lang="de-CH"/>
           </a:p>
@@ -2260,7 +2280,7 @@
     </p:spTree>
     <p:extLst>
       <p:ext uri="{BB962C8B-B14F-4D97-AF65-F5344CB8AC3E}">
-        <p14:creationId xmlns:p14="http://schemas.microsoft.com/office/powerpoint/2010/main" val="3027687940"/>
+        <p14:creationId xmlns:p14="http://schemas.microsoft.com/office/powerpoint/2010/main" val="2216476395"/>
       </p:ext>
     </p:extLst>
   </p:cSld>
@@ -2314,6 +2334,10 @@
           <a:bodyPr/>
           <a:lstStyle/>
           <a:p>
+            <a:r>
+              <a:rPr lang="en-US" dirty="0"/>
+              <a:t>Questions that can be answered in blog posts</a:t>
+            </a:r>
             <a:endParaRPr lang="de-CH" dirty="0"/>
           </a:p>
         </p:txBody>
@@ -2335,7 +2359,7 @@
           <a:p>
             <a:fld id="{9BCA07FD-5BD5-4529-84B0-48DD2C561176}" type="slidenum">
               <a:rPr lang="de-CH" smtClean="0"/>
-              <a:t>24</a:t>
+              <a:t>23</a:t>
             </a:fld>
             <a:endParaRPr lang="de-CH"/>
           </a:p>
@@ -2344,7 +2368,7 @@
     </p:spTree>
     <p:extLst>
       <p:ext uri="{BB962C8B-B14F-4D97-AF65-F5344CB8AC3E}">
-        <p14:creationId xmlns:p14="http://schemas.microsoft.com/office/powerpoint/2010/main" val="771056156"/>
+        <p14:creationId xmlns:p14="http://schemas.microsoft.com/office/powerpoint/2010/main" val="3027687940"/>
       </p:ext>
     </p:extLst>
   </p:cSld>
@@ -2419,6 +2443,90 @@
           <a:p>
             <a:fld id="{9BCA07FD-5BD5-4529-84B0-48DD2C561176}" type="slidenum">
               <a:rPr lang="de-CH" smtClean="0"/>
+              <a:t>24</a:t>
+            </a:fld>
+            <a:endParaRPr lang="de-CH"/>
+          </a:p>
+        </p:txBody>
+      </p:sp>
+    </p:spTree>
+    <p:extLst>
+      <p:ext uri="{BB962C8B-B14F-4D97-AF65-F5344CB8AC3E}">
+        <p14:creationId xmlns:p14="http://schemas.microsoft.com/office/powerpoint/2010/main" val="771056156"/>
+      </p:ext>
+    </p:extLst>
+  </p:cSld>
+  <p:clrMapOvr>
+    <a:masterClrMapping/>
+  </p:clrMapOvr>
+</p:notes>
+</file>
+
+<file path=ppt/notesSlides/notesSlide25.xml><?xml version="1.0" encoding="utf-8"?>
+<p:notes xmlns:a="http://schemas.openxmlformats.org/drawingml/2006/main" xmlns:r="http://schemas.openxmlformats.org/officeDocument/2006/relationships" xmlns:p="http://schemas.openxmlformats.org/presentationml/2006/main">
+  <p:cSld>
+    <p:spTree>
+      <p:nvGrpSpPr>
+        <p:cNvPr id="1" name=""/>
+        <p:cNvGrpSpPr/>
+        <p:nvPr/>
+      </p:nvGrpSpPr>
+      <p:grpSpPr>
+        <a:xfrm>
+          <a:off x="0" y="0"/>
+          <a:ext cx="0" cy="0"/>
+          <a:chOff x="0" y="0"/>
+          <a:chExt cx="0" cy="0"/>
+        </a:xfrm>
+      </p:grpSpPr>
+      <p:sp>
+        <p:nvSpPr>
+          <p:cNvPr id="2" name="Slide Image Placeholder 1"/>
+          <p:cNvSpPr>
+            <a:spLocks noGrp="1" noRot="1" noChangeAspect="1"/>
+          </p:cNvSpPr>
+          <p:nvPr>
+            <p:ph type="sldImg"/>
+          </p:nvPr>
+        </p:nvSpPr>
+        <p:spPr/>
+      </p:sp>
+      <p:sp>
+        <p:nvSpPr>
+          <p:cNvPr id="3" name="Notes Placeholder 2"/>
+          <p:cNvSpPr>
+            <a:spLocks noGrp="1"/>
+          </p:cNvSpPr>
+          <p:nvPr>
+            <p:ph type="body" idx="1"/>
+          </p:nvPr>
+        </p:nvSpPr>
+        <p:spPr/>
+        <p:txBody>
+          <a:bodyPr/>
+          <a:lstStyle/>
+          <a:p>
+            <a:endParaRPr lang="de-CH" dirty="0"/>
+          </a:p>
+        </p:txBody>
+      </p:sp>
+      <p:sp>
+        <p:nvSpPr>
+          <p:cNvPr id="4" name="Slide Number Placeholder 3"/>
+          <p:cNvSpPr>
+            <a:spLocks noGrp="1"/>
+          </p:cNvSpPr>
+          <p:nvPr>
+            <p:ph type="sldNum" sz="quarter" idx="10"/>
+          </p:nvPr>
+        </p:nvSpPr>
+        <p:spPr/>
+        <p:txBody>
+          <a:bodyPr/>
+          <a:lstStyle/>
+          <a:p>
+            <a:fld id="{9BCA07FD-5BD5-4529-84B0-48DD2C561176}" type="slidenum">
+              <a:rPr lang="de-CH" smtClean="0"/>
               <a:t>25</a:t>
             </a:fld>
             <a:endParaRPr lang="de-CH"/>
@@ -2438,7 +2546,7 @@
 </p:notes>
 </file>
 
-<file path=ppt/notesSlides/notesSlide25.xml><?xml version="1.0" encoding="utf-8"?>
+<file path=ppt/notesSlides/notesSlide26.xml><?xml version="1.0" encoding="utf-8"?>
 <p:notes xmlns:a="http://schemas.openxmlformats.org/drawingml/2006/main" xmlns:r="http://schemas.openxmlformats.org/officeDocument/2006/relationships" xmlns:p="http://schemas.openxmlformats.org/presentationml/2006/main">
   <p:cSld>
     <p:spTree>
@@ -2862,7 +2970,7 @@
           <a:p>
             <a:r>
               <a:rPr lang="en-US" dirty="0"/>
-              <a:t>The first architecture approach</a:t>
+              <a:t>In their first architecture approach the team went with the proposal from Karl, after all Architect’s are always right, right, right???</a:t>
             </a:r>
             <a:endParaRPr lang="de-CH" dirty="0"/>
           </a:p>
@@ -2948,7 +3056,44 @@
           <a:bodyPr/>
           <a:lstStyle/>
           <a:p>
-            <a:endParaRPr lang="en-CH" dirty="0"/>
+            <a:r>
+              <a:rPr lang="en-US" dirty="0"/>
+              <a:t>Stateless </a:t>
+            </a:r>
+            <a:r>
+              <a:rPr lang="en-US" dirty="0" err="1"/>
+              <a:t>FrontEnd</a:t>
+            </a:r>
+            <a:r>
+              <a:rPr lang="en-US" dirty="0"/>
+              <a:t> with ASP.NET Core</a:t>
+            </a:r>
+          </a:p>
+          <a:p>
+            <a:r>
+              <a:rPr lang="en-US" dirty="0"/>
+              <a:t>Orders and Queries for Orders use RPC over HTTP (Microservices is all HTTP, the hipster protocol of the twenty first century)</a:t>
+            </a:r>
+          </a:p>
+          <a:p>
+            <a:r>
+              <a:rPr lang="en-US" dirty="0"/>
+              <a:t>The front end communicates with the stateless web API the serves data from the storage tier out of the DB cluster</a:t>
+            </a:r>
+          </a:p>
+          <a:p>
+            <a:r>
+              <a:rPr lang="en-US" dirty="0"/>
+              <a:t>The API controllers use </a:t>
+            </a:r>
+            <a:r>
+              <a:rPr lang="en-US" dirty="0" err="1"/>
+              <a:t>EntityFramework</a:t>
+            </a:r>
+            <a:r>
+              <a:rPr lang="en-US" dirty="0"/>
+              <a:t> and transactions for read and write</a:t>
+            </a:r>
           </a:p>
         </p:txBody>
       </p:sp>
@@ -3034,9 +3179,39 @@
           <a:p>
             <a:r>
               <a:rPr lang="en-US" dirty="0"/>
-              <a:t>Let’s see what the team came up with.</a:t>
-            </a:r>
-            <a:endParaRPr lang="de-CH" dirty="0"/>
+              <a:t>The front-end uses an HTTP Client to initiate the communication with the backend. </a:t>
+            </a:r>
+          </a:p>
+          <a:p>
+            <a:r>
+              <a:rPr lang="en-US" dirty="0"/>
+              <a:t>The backend location is not known up front and needs to be discovered via the </a:t>
+            </a:r>
+            <a:r>
+              <a:rPr lang="en-US" dirty="0" err="1"/>
+              <a:t>buil</a:t>
+            </a:r>
+            <a:r>
+              <a:rPr lang="en-US" dirty="0"/>
+              <a:t>-in Fabric DNS and communication can happen over the built in reverse proxy if the backend is scaled out. </a:t>
+            </a:r>
+          </a:p>
+          <a:p>
+            <a:r>
+              <a:rPr lang="en-US" dirty="0"/>
+              <a:t>The backend exposes the web API with uniquely identifiable and addressable kestrel listeners</a:t>
+            </a:r>
+          </a:p>
+          <a:p>
+            <a:r>
+              <a:rPr lang="en-US" dirty="0" err="1"/>
+              <a:t>Nuff</a:t>
+            </a:r>
+            <a:r>
+              <a:rPr lang="en-US" dirty="0"/>
+              <a:t> said, let’s dive into what the team built</a:t>
+            </a:r>
+            <a:endParaRPr lang="en-CH" dirty="0"/>
           </a:p>
         </p:txBody>
       </p:sp>
@@ -3055,18 +3230,18 @@
           <a:bodyPr/>
           <a:lstStyle/>
           <a:p>
-            <a:fld id="{9BCA07FD-5BD5-4529-84B0-48DD2C561176}" type="slidenum">
-              <a:rPr lang="de-CH" smtClean="0"/>
-              <a:t>8</a:t>
+            <a:fld id="{59E9685D-E391-4BCC-987B-6FB0218A8DB9}" type="slidenum">
+              <a:rPr lang="en-US" smtClean="0"/>
+              <a:t>7</a:t>
             </a:fld>
-            <a:endParaRPr lang="de-CH"/>
+            <a:endParaRPr lang="en-US"/>
           </a:p>
         </p:txBody>
       </p:sp>
     </p:spTree>
     <p:extLst>
       <p:ext uri="{BB962C8B-B14F-4D97-AF65-F5344CB8AC3E}">
-        <p14:creationId xmlns:p14="http://schemas.microsoft.com/office/powerpoint/2010/main" val="3688755719"/>
+        <p14:creationId xmlns:p14="http://schemas.microsoft.com/office/powerpoint/2010/main" val="2657936699"/>
       </p:ext>
     </p:extLst>
   </p:cSld>
@@ -3122,63 +3297,9 @@
           <a:p>
             <a:r>
               <a:rPr lang="en-US" dirty="0"/>
-              <a:t>The team realized although with Service Fabrics high availability and the built in retries on the http client communication layer their architecture approach was not quite there yet where it should be in terms of scalability.</a:t>
-            </a:r>
-          </a:p>
-          <a:p>
-            <a:endParaRPr lang="en-US" dirty="0"/>
-          </a:p>
-          <a:p>
-            <a:r>
-              <a:rPr lang="en-US" dirty="0"/>
-              <a:t>Because of the RPC call chain when ever the latency between the DB cluster and the backend was slow or there was a concurrent update on a row those effects rippled through the </a:t>
-            </a:r>
-            <a:r>
-              <a:rPr lang="en-US" dirty="0" err="1"/>
-              <a:t>callstack</a:t>
-            </a:r>
-            <a:r>
-              <a:rPr lang="en-US" dirty="0"/>
-              <a:t> to the issuer of the call, which is the front-end. </a:t>
-            </a:r>
-          </a:p>
-          <a:p>
-            <a:r>
-              <a:rPr lang="en-US" dirty="0"/>
-              <a:t>Furthermore on every request from the front-end a new database transaction was created and when many operations were pending those transactions sometimes rolled back or slowed down the order processing</a:t>
-            </a:r>
-          </a:p>
-          <a:p>
-            <a:r>
-              <a:rPr lang="en-US" dirty="0"/>
-              <a:t>The temporal and special coupling introduced was horrible. The latency of the storage layer directly influenced the customer facing latency. </a:t>
-            </a:r>
-          </a:p>
-          <a:p>
-            <a:r>
-              <a:rPr lang="en-US" dirty="0"/>
-              <a:t>SLA couldn’t be fulfilled</a:t>
-            </a:r>
-          </a:p>
-          <a:p>
-            <a:r>
-              <a:rPr lang="en-US" dirty="0"/>
-              <a:t>Orders got lest when the client of the request stopped retrying</a:t>
-            </a:r>
-          </a:p>
-          <a:p>
-            <a:r>
-              <a:rPr lang="en-US" dirty="0"/>
-              <a:t>Orders could not be throttled and worst the actual order intent was difficult to find in HTTP </a:t>
-            </a:r>
-            <a:r>
-              <a:rPr lang="en-US" dirty="0" err="1"/>
-              <a:t>callstack</a:t>
-            </a:r>
-            <a:r>
-              <a:rPr lang="en-US" dirty="0"/>
-              <a:t> exception logs</a:t>
-            </a:r>
+              <a:t>Let’s see what the team came up with.</a:t>
+            </a:r>
+            <a:endParaRPr lang="de-CH" dirty="0"/>
           </a:p>
         </p:txBody>
       </p:sp>
@@ -3199,7 +3320,7 @@
           <a:p>
             <a:fld id="{9BCA07FD-5BD5-4529-84B0-48DD2C561176}" type="slidenum">
               <a:rPr lang="de-CH" smtClean="0"/>
-              <a:t>9</a:t>
+              <a:t>8</a:t>
             </a:fld>
             <a:endParaRPr lang="de-CH"/>
           </a:p>
@@ -3208,7 +3329,7 @@
     </p:spTree>
     <p:extLst>
       <p:ext uri="{BB962C8B-B14F-4D97-AF65-F5344CB8AC3E}">
-        <p14:creationId xmlns:p14="http://schemas.microsoft.com/office/powerpoint/2010/main" val="3192863166"/>
+        <p14:creationId xmlns:p14="http://schemas.microsoft.com/office/powerpoint/2010/main" val="3688755719"/>
       </p:ext>
     </p:extLst>
   </p:cSld>
@@ -3264,9 +3385,63 @@
           <a:p>
             <a:r>
               <a:rPr lang="en-US" dirty="0"/>
-              <a:t>So they started brainstorming an additional architecture approach.</a:t>
-            </a:r>
-            <a:endParaRPr lang="de-CH" dirty="0"/>
+              <a:t>The team realized although with Service Fabrics high availability and the built in retries on the http client communication layer their architecture approach was not quite there yet where it should be in terms of scalability.</a:t>
+            </a:r>
+          </a:p>
+          <a:p>
+            <a:endParaRPr lang="en-US" dirty="0"/>
+          </a:p>
+          <a:p>
+            <a:r>
+              <a:rPr lang="en-US" dirty="0"/>
+              <a:t>Because of the RPC call chain when ever the latency between the DB cluster and the backend was slow or there was a concurrent update on a row those effects rippled through the </a:t>
+            </a:r>
+            <a:r>
+              <a:rPr lang="en-US" dirty="0" err="1"/>
+              <a:t>callstack</a:t>
+            </a:r>
+            <a:r>
+              <a:rPr lang="en-US" dirty="0"/>
+              <a:t> to the issuer of the call, which is the front-end. </a:t>
+            </a:r>
+          </a:p>
+          <a:p>
+            <a:r>
+              <a:rPr lang="en-US" dirty="0"/>
+              <a:t>Furthermore on every request from the front-end a new database transaction was created and when many operations were pending those transactions sometimes rolled back or slowed down the order processing</a:t>
+            </a:r>
+          </a:p>
+          <a:p>
+            <a:r>
+              <a:rPr lang="en-US" dirty="0"/>
+              <a:t>The temporal and special coupling introduced was horrible. The latency of the storage layer directly influenced the customer facing latency. </a:t>
+            </a:r>
+          </a:p>
+          <a:p>
+            <a:r>
+              <a:rPr lang="en-US" dirty="0"/>
+              <a:t>SLA couldn’t be fulfilled</a:t>
+            </a:r>
+          </a:p>
+          <a:p>
+            <a:r>
+              <a:rPr lang="en-US" dirty="0"/>
+              <a:t>Orders got lest when the client of the request stopped retrying</a:t>
+            </a:r>
+          </a:p>
+          <a:p>
+            <a:r>
+              <a:rPr lang="en-US" dirty="0"/>
+              <a:t>Orders could not be throttled and worst the actual order intent was difficult to find in HTTP </a:t>
+            </a:r>
+            <a:r>
+              <a:rPr lang="en-US" dirty="0" err="1"/>
+              <a:t>callstack</a:t>
+            </a:r>
+            <a:r>
+              <a:rPr lang="en-US" dirty="0"/>
+              <a:t> exception logs</a:t>
+            </a:r>
           </a:p>
         </p:txBody>
       </p:sp>
@@ -3287,7 +3462,7 @@
           <a:p>
             <a:fld id="{9BCA07FD-5BD5-4529-84B0-48DD2C561176}" type="slidenum">
               <a:rPr lang="de-CH" smtClean="0"/>
-              <a:t>10</a:t>
+              <a:t>9</a:t>
             </a:fld>
             <a:endParaRPr lang="de-CH"/>
           </a:p>
@@ -3296,7 +3471,7 @@
     </p:spTree>
     <p:extLst>
       <p:ext uri="{BB962C8B-B14F-4D97-AF65-F5344CB8AC3E}">
-        <p14:creationId xmlns:p14="http://schemas.microsoft.com/office/powerpoint/2010/main" val="1944380609"/>
+        <p14:creationId xmlns:p14="http://schemas.microsoft.com/office/powerpoint/2010/main" val="3192863166"/>
       </p:ext>
     </p:extLst>
   </p:cSld>
@@ -3453,7 +3628,7 @@
           <a:p>
             <a:fld id="{AF502539-8799-4C51-9271-A94D674129BE}" type="datetimeFigureOut">
               <a:rPr lang="en-US" smtClean="0"/>
-              <a:t>10/25/2017</a:t>
+              <a:t>10/26/2017</a:t>
             </a:fld>
             <a:endParaRPr lang="en-US"/>
           </a:p>
@@ -3651,7 +3826,7 @@
           <a:p>
             <a:fld id="{AF502539-8799-4C51-9271-A94D674129BE}" type="datetimeFigureOut">
               <a:rPr lang="en-US" smtClean="0"/>
-              <a:t>10/25/2017</a:t>
+              <a:t>10/26/2017</a:t>
             </a:fld>
             <a:endParaRPr lang="en-US"/>
           </a:p>
@@ -3859,7 +4034,7 @@
           <a:p>
             <a:fld id="{AF502539-8799-4C51-9271-A94D674129BE}" type="datetimeFigureOut">
               <a:rPr lang="en-US" smtClean="0"/>
-              <a:t>10/25/2017</a:t>
+              <a:t>10/26/2017</a:t>
             </a:fld>
             <a:endParaRPr lang="en-US"/>
           </a:p>
@@ -4057,7 +4232,7 @@
           <a:p>
             <a:fld id="{AF502539-8799-4C51-9271-A94D674129BE}" type="datetimeFigureOut">
               <a:rPr lang="en-US" smtClean="0"/>
-              <a:t>10/25/2017</a:t>
+              <a:t>10/26/2017</a:t>
             </a:fld>
             <a:endParaRPr lang="en-US"/>
           </a:p>
@@ -4332,7 +4507,7 @@
           <a:p>
             <a:fld id="{AF502539-8799-4C51-9271-A94D674129BE}" type="datetimeFigureOut">
               <a:rPr lang="en-US" smtClean="0"/>
-              <a:t>10/25/2017</a:t>
+              <a:t>10/26/2017</a:t>
             </a:fld>
             <a:endParaRPr lang="en-US"/>
           </a:p>
@@ -4597,7 +4772,7 @@
           <a:p>
             <a:fld id="{AF502539-8799-4C51-9271-A94D674129BE}" type="datetimeFigureOut">
               <a:rPr lang="en-US" smtClean="0"/>
-              <a:t>10/25/2017</a:t>
+              <a:t>10/26/2017</a:t>
             </a:fld>
             <a:endParaRPr lang="en-US"/>
           </a:p>
@@ -5009,7 +5184,7 @@
           <a:p>
             <a:fld id="{AF502539-8799-4C51-9271-A94D674129BE}" type="datetimeFigureOut">
               <a:rPr lang="en-US" smtClean="0"/>
-              <a:t>10/25/2017</a:t>
+              <a:t>10/26/2017</a:t>
             </a:fld>
             <a:endParaRPr lang="en-US"/>
           </a:p>
@@ -5150,7 +5325,7 @@
           <a:p>
             <a:fld id="{AF502539-8799-4C51-9271-A94D674129BE}" type="datetimeFigureOut">
               <a:rPr lang="en-US" smtClean="0"/>
-              <a:t>10/25/2017</a:t>
+              <a:t>10/26/2017</a:t>
             </a:fld>
             <a:endParaRPr lang="en-US"/>
           </a:p>
@@ -5263,7 +5438,7 @@
           <a:p>
             <a:fld id="{AF502539-8799-4C51-9271-A94D674129BE}" type="datetimeFigureOut">
               <a:rPr lang="en-US" smtClean="0"/>
-              <a:t>10/25/2017</a:t>
+              <a:t>10/26/2017</a:t>
             </a:fld>
             <a:endParaRPr lang="en-US"/>
           </a:p>
@@ -5574,7 +5749,7 @@
           <a:p>
             <a:fld id="{AF502539-8799-4C51-9271-A94D674129BE}" type="datetimeFigureOut">
               <a:rPr lang="en-US" smtClean="0"/>
-              <a:t>10/25/2017</a:t>
+              <a:t>10/26/2017</a:t>
             </a:fld>
             <a:endParaRPr lang="en-US"/>
           </a:p>
@@ -5862,7 +6037,7 @@
           <a:p>
             <a:fld id="{AF502539-8799-4C51-9271-A94D674129BE}" type="datetimeFigureOut">
               <a:rPr lang="en-US" smtClean="0"/>
-              <a:t>10/25/2017</a:t>
+              <a:t>10/26/2017</a:t>
             </a:fld>
             <a:endParaRPr lang="en-US"/>
           </a:p>
@@ -6103,7 +6278,7 @@
           <a:p>
             <a:fld id="{AF502539-8799-4C51-9271-A94D674129BE}" type="datetimeFigureOut">
               <a:rPr lang="en-US" smtClean="0"/>
-              <a:t>10/25/2017</a:t>
+              <a:t>10/26/2017</a:t>
             </a:fld>
             <a:endParaRPr lang="en-US"/>
           </a:p>
@@ -8077,7 +8252,7 @@
         <p:spPr>
           <a:xfrm>
             <a:off x="454350" y="5153348"/>
-            <a:ext cx="912429" cy="338554"/>
+            <a:ext cx="1321196" cy="338554"/>
           </a:xfrm>
           <a:prstGeom prst="rect">
             <a:avLst/>
@@ -8097,7 +8272,7 @@
                 </a:solidFill>
                 <a:latin typeface="Yanone Kaffeesatz Regular" panose="02000000000000000000" pitchFamily="2" charset="0"/>
               </a:rPr>
-              <a:t>MSG Cluster</a:t>
+              <a:t>Messaging Cluster</a:t>
             </a:r>
             <a:endParaRPr lang="de-CH" sz="1600" dirty="0">
               <a:solidFill>
@@ -8541,7 +8716,7 @@
         <p:spPr>
           <a:xfrm>
             <a:off x="1684494" y="5133028"/>
-            <a:ext cx="1592103" cy="338554"/>
+            <a:ext cx="1321196" cy="338554"/>
           </a:xfrm>
           <a:prstGeom prst="rect">
             <a:avLst/>
@@ -8561,7 +8736,7 @@
                 </a:solidFill>
                 <a:latin typeface="Yanone Kaffeesatz Regular" panose="02000000000000000000" pitchFamily="2" charset="0"/>
               </a:rPr>
-              <a:t>Messaging Middleware</a:t>
+              <a:t>Messaging Cluster</a:t>
             </a:r>
             <a:endParaRPr lang="de-CH" sz="1600" dirty="0">
               <a:solidFill>
@@ -9813,7 +9988,7 @@
         <p:spPr>
           <a:xfrm>
             <a:off x="454350" y="5153348"/>
-            <a:ext cx="1592103" cy="338554"/>
+            <a:ext cx="1321196" cy="338554"/>
           </a:xfrm>
           <a:prstGeom prst="rect">
             <a:avLst/>
@@ -9833,7 +10008,7 @@
                 </a:solidFill>
                 <a:latin typeface="Yanone Kaffeesatz Regular" panose="02000000000000000000" pitchFamily="2" charset="0"/>
               </a:rPr>
-              <a:t>Messaging Middleware</a:t>
+              <a:t>Messaging Cluster</a:t>
             </a:r>
             <a:endParaRPr lang="de-CH" sz="1600" dirty="0">
               <a:solidFill>
@@ -12068,7 +12243,7 @@
         <p:spPr>
           <a:xfrm>
             <a:off x="454350" y="5153348"/>
-            <a:ext cx="912429" cy="338554"/>
+            <a:ext cx="1321196" cy="338554"/>
           </a:xfrm>
           <a:prstGeom prst="rect">
             <a:avLst/>
@@ -12088,7 +12263,7 @@
                 </a:solidFill>
                 <a:latin typeface="Yanone Kaffeesatz Regular" panose="02000000000000000000" pitchFamily="2" charset="0"/>
               </a:rPr>
-              <a:t>MSG Cluster</a:t>
+              <a:t>Messaging Cluster</a:t>
             </a:r>
             <a:endParaRPr lang="de-CH" sz="1600" dirty="0">
               <a:solidFill>
@@ -12916,8 +13091,8 @@
         </p:nvSpPr>
         <p:spPr>
           <a:xfrm>
-            <a:off x="2348821" y="1174537"/>
-            <a:ext cx="7494359" cy="4508927"/>
+            <a:off x="627997" y="1174537"/>
+            <a:ext cx="10936007" cy="4508927"/>
           </a:xfrm>
           <a:prstGeom prst="rect">
             <a:avLst/>
@@ -12937,7 +13112,7 @@
                 </a:solidFill>
                 <a:latin typeface="Yanone Kaffeesatz Regular" panose="02000000000000000000" pitchFamily="2" charset="0"/>
               </a:rPr>
-              <a:t>orders</a:t>
+              <a:t>chocolate</a:t>
             </a:r>
             <a:endParaRPr lang="de-CH" sz="9600" dirty="0">
               <a:solidFill>
@@ -17705,7 +17880,7 @@
         <p:spPr>
           <a:xfrm>
             <a:off x="8846457" y="3823305"/>
-            <a:ext cx="976549" cy="461665"/>
+            <a:ext cx="1040670" cy="461665"/>
           </a:xfrm>
           <a:prstGeom prst="rect">
             <a:avLst/>
@@ -17719,13 +17894,13 @@
           <a:lstStyle/>
           <a:p>
             <a:r>
-              <a:rPr lang="en-US" sz="2400" dirty="0">
+              <a:rPr lang="en-US" sz="2400" dirty="0" err="1">
                 <a:solidFill>
                   <a:schemeClr val="accent3"/>
                 </a:solidFill>
                 <a:latin typeface="Yanone Kaffeesatz Regular" panose="02000000000000000000" pitchFamily="2" charset="0"/>
               </a:rPr>
-              <a:t>ADO.NET</a:t>
+              <a:t>EntityFW</a:t>
             </a:r>
             <a:endParaRPr lang="de-CH" sz="2400" dirty="0">
               <a:solidFill>

</xml_diff>

<commit_message>
Slides and readme updates
</commit_message>
<xml_diff>
--- a/Slides.pptx
+++ b/Slides.pptx
@@ -226,7 +226,7 @@
           <a:p>
             <a:fld id="{8AAC1278-1473-493B-ACC6-443853387D40}" type="datetimeFigureOut">
               <a:rPr lang="en-US" smtClean="0"/>
-              <a:t>10/26/2017</a:t>
+              <a:t>10/27/2017</a:t>
             </a:fld>
             <a:endParaRPr lang="en-US"/>
           </a:p>
@@ -1632,7 +1632,34 @@
           <a:bodyPr/>
           <a:lstStyle/>
           <a:p>
-            <a:endParaRPr lang="de-CH" dirty="0"/>
+            <a:r>
+              <a:rPr lang="de-CH" dirty="0"/>
+              <a:t>The backend is turned into a stateful service and uses a Reliable Collection to store the orders</a:t>
+            </a:r>
+          </a:p>
+          <a:p>
+            <a:r>
+              <a:rPr lang="de-CH" dirty="0"/>
+              <a:t>Queries are executed against the reliable collection</a:t>
+            </a:r>
+          </a:p>
+          <a:p>
+            <a:r>
+              <a:rPr lang="de-CH" dirty="0"/>
+              <a:t>Orders are still submitted over the queue but now the handler no longer accesses the database but the reliable collection to effeciently and transactionally store orders</a:t>
+            </a:r>
+          </a:p>
+          <a:p>
+            <a:r>
+              <a:rPr lang="de-CH" dirty="0"/>
+              <a:t>The storage tier is only needed for exhaust or offline analytics purposes</a:t>
+            </a:r>
+          </a:p>
+          <a:p>
+            <a:r>
+              <a:rPr lang="de-CH" dirty="0"/>
+              <a:t>For simplicity reasons this picture doesn’t take partitioning into account. Let’s see how partitioning influences the query side</a:t>
+            </a:r>
           </a:p>
         </p:txBody>
       </p:sp>
@@ -1716,7 +1743,10 @@
           <a:bodyPr/>
           <a:lstStyle/>
           <a:p>
-            <a:endParaRPr lang="de-CH" dirty="0"/>
+            <a:r>
+              <a:rPr lang="de-CH" dirty="0"/>
+              <a:t>Because the data is now split over multiple partitions on multiple nodes a query has to fanout to all the partitions owning the data when it wants to present all the data form all the partitions</a:t>
+            </a:r>
           </a:p>
         </p:txBody>
       </p:sp>
@@ -2145,15 +2175,6 @@
             <a:r>
               <a:rPr lang="en-US" dirty="0"/>
               <a:t>(click)</a:t>
-            </a:r>
-          </a:p>
-          <a:p>
-            <a:endParaRPr lang="en-US" dirty="0"/>
-          </a:p>
-          <a:p>
-            <a:r>
-              <a:rPr lang="en-US" dirty="0"/>
-              <a:t>To keep it aligned with Peters lingo let’s call this receiver side distribution although I know this is not an official term!</a:t>
             </a:r>
           </a:p>
           <a:p>
@@ -3628,7 +3649,7 @@
           <a:p>
             <a:fld id="{AF502539-8799-4C51-9271-A94D674129BE}" type="datetimeFigureOut">
               <a:rPr lang="en-US" smtClean="0"/>
-              <a:t>10/26/2017</a:t>
+              <a:t>10/27/2017</a:t>
             </a:fld>
             <a:endParaRPr lang="en-US"/>
           </a:p>
@@ -3826,7 +3847,7 @@
           <a:p>
             <a:fld id="{AF502539-8799-4C51-9271-A94D674129BE}" type="datetimeFigureOut">
               <a:rPr lang="en-US" smtClean="0"/>
-              <a:t>10/26/2017</a:t>
+              <a:t>10/27/2017</a:t>
             </a:fld>
             <a:endParaRPr lang="en-US"/>
           </a:p>
@@ -4034,7 +4055,7 @@
           <a:p>
             <a:fld id="{AF502539-8799-4C51-9271-A94D674129BE}" type="datetimeFigureOut">
               <a:rPr lang="en-US" smtClean="0"/>
-              <a:t>10/26/2017</a:t>
+              <a:t>10/27/2017</a:t>
             </a:fld>
             <a:endParaRPr lang="en-US"/>
           </a:p>
@@ -4232,7 +4253,7 @@
           <a:p>
             <a:fld id="{AF502539-8799-4C51-9271-A94D674129BE}" type="datetimeFigureOut">
               <a:rPr lang="en-US" smtClean="0"/>
-              <a:t>10/26/2017</a:t>
+              <a:t>10/27/2017</a:t>
             </a:fld>
             <a:endParaRPr lang="en-US"/>
           </a:p>
@@ -4507,7 +4528,7 @@
           <a:p>
             <a:fld id="{AF502539-8799-4C51-9271-A94D674129BE}" type="datetimeFigureOut">
               <a:rPr lang="en-US" smtClean="0"/>
-              <a:t>10/26/2017</a:t>
+              <a:t>10/27/2017</a:t>
             </a:fld>
             <a:endParaRPr lang="en-US"/>
           </a:p>
@@ -4772,7 +4793,7 @@
           <a:p>
             <a:fld id="{AF502539-8799-4C51-9271-A94D674129BE}" type="datetimeFigureOut">
               <a:rPr lang="en-US" smtClean="0"/>
-              <a:t>10/26/2017</a:t>
+              <a:t>10/27/2017</a:t>
             </a:fld>
             <a:endParaRPr lang="en-US"/>
           </a:p>
@@ -5184,7 +5205,7 @@
           <a:p>
             <a:fld id="{AF502539-8799-4C51-9271-A94D674129BE}" type="datetimeFigureOut">
               <a:rPr lang="en-US" smtClean="0"/>
-              <a:t>10/26/2017</a:t>
+              <a:t>10/27/2017</a:t>
             </a:fld>
             <a:endParaRPr lang="en-US"/>
           </a:p>
@@ -5325,7 +5346,7 @@
           <a:p>
             <a:fld id="{AF502539-8799-4C51-9271-A94D674129BE}" type="datetimeFigureOut">
               <a:rPr lang="en-US" smtClean="0"/>
-              <a:t>10/26/2017</a:t>
+              <a:t>10/27/2017</a:t>
             </a:fld>
             <a:endParaRPr lang="en-US"/>
           </a:p>
@@ -5438,7 +5459,7 @@
           <a:p>
             <a:fld id="{AF502539-8799-4C51-9271-A94D674129BE}" type="datetimeFigureOut">
               <a:rPr lang="en-US" smtClean="0"/>
-              <a:t>10/26/2017</a:t>
+              <a:t>10/27/2017</a:t>
             </a:fld>
             <a:endParaRPr lang="en-US"/>
           </a:p>
@@ -5749,7 +5770,7 @@
           <a:p>
             <a:fld id="{AF502539-8799-4C51-9271-A94D674129BE}" type="datetimeFigureOut">
               <a:rPr lang="en-US" smtClean="0"/>
-              <a:t>10/26/2017</a:t>
+              <a:t>10/27/2017</a:t>
             </a:fld>
             <a:endParaRPr lang="en-US"/>
           </a:p>
@@ -6037,7 +6058,7 @@
           <a:p>
             <a:fld id="{AF502539-8799-4C51-9271-A94D674129BE}" type="datetimeFigureOut">
               <a:rPr lang="en-US" smtClean="0"/>
-              <a:t>10/26/2017</a:t>
+              <a:t>10/27/2017</a:t>
             </a:fld>
             <a:endParaRPr lang="en-US"/>
           </a:p>
@@ -6278,7 +6299,7 @@
           <a:p>
             <a:fld id="{AF502539-8799-4C51-9271-A94D674129BE}" type="datetimeFigureOut">
               <a:rPr lang="en-US" smtClean="0"/>
-              <a:t>10/26/2017</a:t>
+              <a:t>10/27/2017</a:t>
             </a:fld>
             <a:endParaRPr lang="en-US"/>
           </a:p>
@@ -6768,6 +6789,141 @@
           </a:prstGeom>
         </p:spPr>
       </p:pic>
+      <p:sp>
+        <p:nvSpPr>
+          <p:cNvPr id="4" name="Rectangle 3">
+            <a:extLst>
+              <a:ext uri="{FF2B5EF4-FFF2-40B4-BE49-F238E27FC236}">
+                <a16:creationId xmlns:a16="http://schemas.microsoft.com/office/drawing/2014/main" id="{3FB73D53-DF09-434C-A185-F6D3152F0163}"/>
+              </a:ext>
+            </a:extLst>
+          </p:cNvPr>
+          <p:cNvSpPr/>
+          <p:nvPr/>
+        </p:nvSpPr>
+        <p:spPr>
+          <a:xfrm>
+            <a:off x="1591758" y="4600558"/>
+            <a:ext cx="3786066" cy="954107"/>
+          </a:xfrm>
+          <a:prstGeom prst="rect">
+            <a:avLst/>
+          </a:prstGeom>
+        </p:spPr>
+        <p:txBody>
+          <a:bodyPr wrap="square">
+            <a:spAutoFit/>
+          </a:bodyPr>
+          <a:lstStyle/>
+          <a:p>
+            <a:r>
+              <a:rPr lang="en-US" sz="2800" dirty="0">
+                <a:solidFill>
+                  <a:schemeClr val="bg1">
+                    <a:lumMod val="65000"/>
+                  </a:schemeClr>
+                </a:solidFill>
+                <a:latin typeface="Yanone Kaffeesatz Regular" panose="02000000000000000000" pitchFamily="2" charset="0"/>
+              </a:rPr>
+              <a:t>daniel.marbach@particular.net</a:t>
+            </a:r>
+            <a:br>
+              <a:rPr lang="en-US" sz="2800" dirty="0">
+                <a:solidFill>
+                  <a:schemeClr val="bg1">
+                    <a:lumMod val="65000"/>
+                  </a:schemeClr>
+                </a:solidFill>
+                <a:latin typeface="Yanone Kaffeesatz Regular" panose="02000000000000000000" pitchFamily="2" charset="0"/>
+              </a:rPr>
+            </a:br>
+            <a:r>
+              <a:rPr lang="en-US" sz="2800" dirty="0">
+                <a:solidFill>
+                  <a:schemeClr val="bg1">
+                    <a:lumMod val="65000"/>
+                  </a:schemeClr>
+                </a:solidFill>
+                <a:latin typeface="Yanone Kaffeesatz Regular" panose="02000000000000000000" pitchFamily="2" charset="0"/>
+              </a:rPr>
+              <a:t>@danielmarbach</a:t>
+            </a:r>
+          </a:p>
+        </p:txBody>
+      </p:sp>
+      <p:sp>
+        <p:nvSpPr>
+          <p:cNvPr id="5" name="Rectangle 4">
+            <a:extLst>
+              <a:ext uri="{FF2B5EF4-FFF2-40B4-BE49-F238E27FC236}">
+                <a16:creationId xmlns:a16="http://schemas.microsoft.com/office/drawing/2014/main" id="{8372EA16-2B21-4C87-B023-1B36A481A9F7}"/>
+              </a:ext>
+            </a:extLst>
+          </p:cNvPr>
+          <p:cNvSpPr/>
+          <p:nvPr/>
+        </p:nvSpPr>
+        <p:spPr>
+          <a:xfrm>
+            <a:off x="7169598" y="4600558"/>
+            <a:ext cx="3786066" cy="954107"/>
+          </a:xfrm>
+          <a:prstGeom prst="rect">
+            <a:avLst/>
+          </a:prstGeom>
+        </p:spPr>
+        <p:txBody>
+          <a:bodyPr wrap="square">
+            <a:spAutoFit/>
+          </a:bodyPr>
+          <a:lstStyle/>
+          <a:p>
+            <a:r>
+              <a:rPr lang="en-US" sz="2800" dirty="0">
+                <a:solidFill>
+                  <a:schemeClr val="bg1">
+                    <a:lumMod val="65000"/>
+                  </a:schemeClr>
+                </a:solidFill>
+                <a:latin typeface="Yanone Kaffeesatz Regular" panose="02000000000000000000" pitchFamily="2" charset="0"/>
+              </a:rPr>
+              <a:t>bob.langley@particular.net</a:t>
+            </a:r>
+          </a:p>
+          <a:p>
+            <a:r>
+              <a:rPr lang="en-US" sz="2800" dirty="0">
+                <a:solidFill>
+                  <a:schemeClr val="bg1">
+                    <a:lumMod val="65000"/>
+                  </a:schemeClr>
+                </a:solidFill>
+                <a:latin typeface="Yanone Kaffeesatz Regular" panose="02000000000000000000" pitchFamily="2" charset="0"/>
+              </a:rPr>
+              <a:t>@</a:t>
+            </a:r>
+            <a:r>
+              <a:rPr lang="en-US" sz="2800" dirty="0" err="1">
+                <a:solidFill>
+                  <a:schemeClr val="bg1">
+                    <a:lumMod val="65000"/>
+                  </a:schemeClr>
+                </a:solidFill>
+                <a:latin typeface="Yanone Kaffeesatz Regular" panose="02000000000000000000" pitchFamily="2" charset="0"/>
+              </a:rPr>
+              <a:t>boblangley</a:t>
+            </a:r>
+            <a:endParaRPr lang="en-US" sz="2800" dirty="0">
+              <a:solidFill>
+                <a:schemeClr val="bg1">
+                  <a:lumMod val="65000"/>
+                </a:schemeClr>
+              </a:solidFill>
+              <a:latin typeface="Yanone Kaffeesatz Regular" panose="02000000000000000000" pitchFamily="2" charset="0"/>
+            </a:endParaRPr>
+          </a:p>
+        </p:txBody>
+      </p:sp>
     </p:spTree>
     <p:extLst>
       <p:ext uri="{BB962C8B-B14F-4D97-AF65-F5344CB8AC3E}">

</xml_diff>